<commit_message>
More minor edits & touch-ups
</commit_message>
<xml_diff>
--- a/ea_in_a_devops_time.pptx
+++ b/ea_in_a_devops_time.pptx
@@ -2322,8 +2322,29 @@
                 <a:ea typeface="+mn-ea"/>
                 <a:cs typeface="+mn-cs"/>
               </a:rPr>
-              <a:t>patches &amp; minor releases are *guaranteed* to be backward compatible, major releases are not</a:t>
-            </a:r>
+              <a:t>patches &amp; minor releases are *guaranteed* to be backward compatible, major releases are </a:t>
+            </a:r>
+            <a:r>
+              <a:rPr lang="en-US" sz="1200" b="0" i="0" u="none" strike="noStrike" kern="1200" dirty="0" smtClean="0">
+                <a:solidFill>
+                  <a:schemeClr val="tx1"/>
+                </a:solidFill>
+                <a:effectLst/>
+                <a:latin typeface="+mn-lt"/>
+                <a:ea typeface="+mn-ea"/>
+                <a:cs typeface="+mn-cs"/>
+              </a:rPr>
+              <a:t>not. And it’s up to you and the teams to fulfill this guarantee.</a:t>
+            </a:r>
+            <a:endParaRPr lang="en-US" sz="1200" b="0" i="0" u="none" strike="noStrike" kern="1200" dirty="0">
+              <a:solidFill>
+                <a:schemeClr val="tx1"/>
+              </a:solidFill>
+              <a:effectLst/>
+              <a:latin typeface="+mn-lt"/>
+              <a:ea typeface="+mn-ea"/>
+              <a:cs typeface="+mn-cs"/>
+            </a:endParaRPr>
           </a:p>
         </p:txBody>
       </p:sp>
@@ -12814,8 +12835,41 @@
                 <a:ea typeface="+mn-ea"/>
                 <a:cs typeface="+mn-cs"/>
               </a:rPr>
-              <a:t>If you have managed to create a "unified IT environment" with "standardized hardware and software systems", you are in the minority of enterprises.</a:t>
-            </a:r>
+              <a:t>If you have managed to create a "unified IT environment" with "standardized hardware and software systems", you are in the minority of </a:t>
+            </a:r>
+            <a:r>
+              <a:rPr lang="en-US" sz="1200" b="0" i="0" u="none" strike="noStrike" kern="1200" dirty="0" smtClean="0">
+                <a:solidFill>
+                  <a:schemeClr val="tx1"/>
+                </a:solidFill>
+                <a:effectLst/>
+                <a:latin typeface="+mn-lt"/>
+                <a:ea typeface="+mn-ea"/>
+                <a:cs typeface="+mn-cs"/>
+              </a:rPr>
+              <a:t>enterprises</a:t>
+            </a:r>
+            <a:r>
+              <a:rPr lang="en-US" sz="1200" b="0" i="0" u="none" strike="noStrike" kern="1200" baseline="0" dirty="0" smtClean="0">
+                <a:solidFill>
+                  <a:schemeClr val="tx1"/>
+                </a:solidFill>
+                <a:effectLst/>
+                <a:latin typeface="+mn-lt"/>
+                <a:ea typeface="+mn-ea"/>
+                <a:cs typeface="+mn-cs"/>
+              </a:rPr>
+              <a:t> (and you are probably leaving new, important capabilities by the wayside)</a:t>
+            </a:r>
+            <a:endParaRPr lang="en-US" sz="1200" b="0" i="0" u="none" strike="noStrike" kern="1200" dirty="0">
+              <a:solidFill>
+                <a:schemeClr val="tx1"/>
+              </a:solidFill>
+              <a:effectLst/>
+              <a:latin typeface="+mn-lt"/>
+              <a:ea typeface="+mn-ea"/>
+              <a:cs typeface="+mn-cs"/>
+            </a:endParaRPr>
           </a:p>
           <a:p>
             <a:pPr rtl="0"/>
@@ -22463,7 +22517,7 @@
         </p:nvSpPr>
         <p:spPr>
           <a:xfrm>
-            <a:off x="911941" y="1356852"/>
+            <a:off x="911941" y="1134426"/>
             <a:ext cx="10515600" cy="3701845"/>
           </a:xfrm>
         </p:spPr>
@@ -22504,8 +22558,8 @@
         </p:nvSpPr>
         <p:spPr>
           <a:xfrm>
-            <a:off x="2104076" y="5058697"/>
-            <a:ext cx="8145178" cy="369332"/>
+            <a:off x="1661551" y="5058697"/>
+            <a:ext cx="9016379" cy="646331"/>
           </a:xfrm>
           <a:prstGeom prst="rect">
             <a:avLst/>
@@ -22518,14 +22572,39 @@
           </a:bodyPr>
           <a:lstStyle/>
           <a:p>
+            <a:pPr algn="ctr"/>
             <a:r>
               <a:rPr lang="en-US" dirty="0">
                 <a:solidFill>
                   <a:schemeClr val="bg1"/>
                 </a:solidFill>
               </a:rPr>
-              <a:t>--Mark Schwartz, author and former CIO of US Citizenship and Immigration Services</a:t>
-            </a:r>
+              <a:t>--Mark Schwartz, author and former CIO of US Citizenship and Immigration </a:t>
+            </a:r>
+            <a:r>
+              <a:rPr lang="en-US" dirty="0" smtClean="0">
+                <a:solidFill>
+                  <a:schemeClr val="bg1"/>
+                </a:solidFill>
+              </a:rPr>
+              <a:t>Services</a:t>
+            </a:r>
+          </a:p>
+          <a:p>
+            <a:pPr algn="ctr"/>
+            <a:r>
+              <a:rPr lang="en-US" dirty="0">
+                <a:solidFill>
+                  <a:schemeClr val="bg1"/>
+                </a:solidFill>
+              </a:rPr>
+              <a:t>https://enterprisersproject.com/article/2017/7/devops-requires-dumping-old-it-leadership-ideas</a:t>
+            </a:r>
+            <a:endParaRPr lang="en-US" dirty="0">
+              <a:solidFill>
+                <a:schemeClr val="bg1"/>
+              </a:solidFill>
+            </a:endParaRPr>
           </a:p>
         </p:txBody>
       </p:sp>
@@ -32098,7 +32177,7 @@
         </p:nvSpPr>
         <p:spPr>
           <a:xfrm>
-            <a:off x="911941" y="1356852"/>
+            <a:off x="911941" y="1208568"/>
             <a:ext cx="10515600" cy="3701845"/>
           </a:xfrm>
         </p:spPr>
@@ -32127,7 +32206,7 @@
       </p:sp>
       <p:sp>
         <p:nvSpPr>
-          <p:cNvPr id="3" name="TextBox 2">
+          <p:cNvPr id="4" name="TextBox 3">
             <a:extLst>
               <a:ext uri="{FF2B5EF4-FFF2-40B4-BE49-F238E27FC236}">
                 <a16:creationId xmlns:a16="http://schemas.microsoft.com/office/drawing/2014/main" id="{180F9816-E23D-C346-9BF5-23F1DA87B087}"/>
@@ -32139,8 +32218,8 @@
         </p:nvSpPr>
         <p:spPr>
           <a:xfrm>
-            <a:off x="2104076" y="5058697"/>
-            <a:ext cx="8145178" cy="369332"/>
+            <a:off x="1661551" y="5058697"/>
+            <a:ext cx="9016379" cy="646331"/>
           </a:xfrm>
           <a:prstGeom prst="rect">
             <a:avLst/>
@@ -32153,14 +32232,39 @@
           </a:bodyPr>
           <a:lstStyle/>
           <a:p>
+            <a:pPr algn="ctr"/>
             <a:r>
               <a:rPr lang="en-US" dirty="0">
                 <a:solidFill>
                   <a:schemeClr val="bg1"/>
                 </a:solidFill>
               </a:rPr>
-              <a:t>--Mark Schwartz, author and former CIO of US Citizenship and Immigration Services</a:t>
-            </a:r>
+              <a:t>--Mark Schwartz, author and former CIO of US Citizenship and Immigration </a:t>
+            </a:r>
+            <a:r>
+              <a:rPr lang="en-US" dirty="0" smtClean="0">
+                <a:solidFill>
+                  <a:schemeClr val="bg1"/>
+                </a:solidFill>
+              </a:rPr>
+              <a:t>Services</a:t>
+            </a:r>
+          </a:p>
+          <a:p>
+            <a:pPr algn="ctr"/>
+            <a:r>
+              <a:rPr lang="en-US" dirty="0">
+                <a:solidFill>
+                  <a:schemeClr val="bg1"/>
+                </a:solidFill>
+              </a:rPr>
+              <a:t>https://enterprisersproject.com/article/2017/7/devops-requires-dumping-old-it-leadership-ideas</a:t>
+            </a:r>
+            <a:endParaRPr lang="en-US" dirty="0">
+              <a:solidFill>
+                <a:schemeClr val="bg1"/>
+              </a:solidFill>
+            </a:endParaRPr>
           </a:p>
         </p:txBody>
       </p:sp>
@@ -32388,7 +32492,7 @@
       </p:sp>
       <p:pic>
         <p:nvPicPr>
-          <p:cNvPr id="3" name="Picture 2"/>
+          <p:cNvPr id="4" name="Picture 3"/>
           <p:cNvPicPr>
             <a:picLocks noChangeAspect="1"/>
           </p:cNvPicPr>
@@ -32408,8 +32512,8 @@
         </p:blipFill>
         <p:spPr>
           <a:xfrm>
-            <a:off x="4850173" y="3375746"/>
-            <a:ext cx="2491653" cy="2491653"/>
+            <a:off x="4860469" y="3276891"/>
+            <a:ext cx="2471060" cy="2471060"/>
           </a:xfrm>
           <a:prstGeom prst="rect">
             <a:avLst/>

</xml_diff>